<commit_message>
Update AI framework version 1.0 build 2025.05.GenAI.
</commit_message>
<xml_diff>
--- a/2_design/generative-ai/artifacts/TutorialTransformer-summary.pptx
+++ b/2_design/generative-ai/artifacts/TutorialTransformer-summary.pptx
@@ -224,7 +224,7 @@
           <a:p>
             <a:fld id="{676B30CB-839A-47A6-9532-260122BEAE9C}" type="datetimeFigureOut">
               <a:rPr lang="en-US" smtClean="0"/>
-              <a:t>11/10/2024</a:t>
+              <a:t>6/20/2025</a:t>
             </a:fld>
             <a:endParaRPr lang="en-US"/>
           </a:p>
@@ -401,7 +401,7 @@
           <a:p>
             <a:fld id="{8E6BD8EF-833A-4756-9DE8-262172883D9B}" type="datetimeFigureOut">
               <a:rPr lang="en-US" smtClean="0"/>
-              <a:t>11/10/2024</a:t>
+              <a:t>6/20/2025</a:t>
             </a:fld>
             <a:endParaRPr lang="en-US"/>
           </a:p>
@@ -1148,7 +1148,7 @@
           <a:p>
             <a:fld id="{16A40ACB-0D57-4A5C-8A4C-E4CDDD1F0570}" type="datetime1">
               <a:rPr lang="en-US" smtClean="0"/>
-              <a:t>11/10/2024</a:t>
+              <a:t>6/20/2025</a:t>
             </a:fld>
             <a:endParaRPr lang="en-US"/>
           </a:p>
@@ -1379,7 +1379,7 @@
           <a:p>
             <a:fld id="{31791DD0-C125-42BC-A0AE-6D08BC0126DA}" type="datetime1">
               <a:rPr lang="en-US" smtClean="0"/>
-              <a:t>11/10/2024</a:t>
+              <a:t>6/20/2025</a:t>
             </a:fld>
             <a:endParaRPr lang="en-US"/>
           </a:p>
@@ -1620,7 +1620,7 @@
           <a:p>
             <a:fld id="{8BB9D2CB-D283-4439-9D99-F53A44E1D269}" type="datetime1">
               <a:rPr lang="en-US" smtClean="0"/>
-              <a:t>11/10/2024</a:t>
+              <a:t>6/20/2025</a:t>
             </a:fld>
             <a:endParaRPr lang="en-US"/>
           </a:p>
@@ -1894,7 +1894,7 @@
           <a:p>
             <a:fld id="{B9626394-AB31-4EB9-8754-BB40B0CDA0D1}" type="datetime1">
               <a:rPr lang="en-US" smtClean="0"/>
-              <a:t>11/10/2024</a:t>
+              <a:t>6/20/2025</a:t>
             </a:fld>
             <a:endParaRPr lang="en-US"/>
           </a:p>
@@ -2169,7 +2169,7 @@
           <a:p>
             <a:fld id="{020969FA-DDAF-4D8D-89BB-FCE85CC6E74F}" type="datetime1">
               <a:rPr lang="en-US" smtClean="0"/>
-              <a:t>11/10/2024</a:t>
+              <a:t>6/20/2025</a:t>
             </a:fld>
             <a:endParaRPr lang="en-US"/>
           </a:p>
@@ -2492,7 +2492,7 @@
           <a:p>
             <a:fld id="{C265981A-766A-4E3B-9014-5F8784C8CC93}" type="datetime1">
               <a:rPr lang="en-US" smtClean="0"/>
-              <a:t>11/10/2024</a:t>
+              <a:t>6/20/2025</a:t>
             </a:fld>
             <a:endParaRPr lang="en-US"/>
           </a:p>
@@ -2956,7 +2956,7 @@
           <a:p>
             <a:fld id="{E972E474-529D-423A-A3DD-59050B8E8A5D}" type="datetime1">
               <a:rPr lang="en-US" smtClean="0"/>
-              <a:t>11/10/2024</a:t>
+              <a:t>6/20/2025</a:t>
             </a:fld>
             <a:endParaRPr lang="en-US"/>
           </a:p>
@@ -3105,7 +3105,7 @@
           <a:p>
             <a:fld id="{FF843691-58FE-4CE0-BE3D-8441F4D8EE71}" type="datetime1">
               <a:rPr lang="en-US" smtClean="0"/>
-              <a:t>11/10/2024</a:t>
+              <a:t>6/20/2025</a:t>
             </a:fld>
             <a:endParaRPr lang="en-US"/>
           </a:p>
@@ -3225,7 +3225,7 @@
           <a:p>
             <a:fld id="{90375853-CF48-4EBB-BF3A-9865D712E192}" type="datetime1">
               <a:rPr lang="en-US" smtClean="0"/>
-              <a:t>11/10/2024</a:t>
+              <a:t>6/20/2025</a:t>
             </a:fld>
             <a:endParaRPr lang="en-US"/>
           </a:p>
@@ -3546,7 +3546,7 @@
           <a:p>
             <a:fld id="{F0B0F3F7-CF64-49D2-9E5D-7A3CCC9606BF}" type="datetime1">
               <a:rPr lang="en-US" smtClean="0"/>
-              <a:t>11/10/2024</a:t>
+              <a:t>6/20/2025</a:t>
             </a:fld>
             <a:endParaRPr lang="en-US"/>
           </a:p>
@@ -3832,7 +3832,7 @@
           <a:p>
             <a:fld id="{B61C00FF-E398-41D0-BE99-9EDAD62BEC18}" type="datetime1">
               <a:rPr lang="en-US" smtClean="0"/>
-              <a:t>11/10/2024</a:t>
+              <a:t>6/20/2025</a:t>
             </a:fld>
             <a:endParaRPr lang="en-US"/>
           </a:p>
@@ -4063,7 +4063,7 @@
           <a:p>
             <a:fld id="{77BE3A39-496D-4D2A-B13B-7FA36018A369}" type="datetime1">
               <a:rPr lang="en-US" smtClean="0"/>
-              <a:t>11/10/2024</a:t>
+              <a:t>6/20/2025</a:t>
             </a:fld>
             <a:endParaRPr lang="en-US"/>
           </a:p>
@@ -4501,7 +4501,11 @@
           <a:p>
             <a:r>
               <a:rPr lang="en-US" sz="4500" b="1" dirty="0"/>
-              <a:t>Tutorial on deep transformer</a:t>
+              <a:t>Tutorial on deep </a:t>
+            </a:r>
+            <a:r>
+              <a:rPr lang="en-US" sz="4500" b="1" dirty="0" smtClean="0"/>
+              <a:t>transformer</a:t>
             </a:r>
             <a:endParaRPr lang="en-US" sz="4500" dirty="0"/>
           </a:p>
@@ -4617,7 +4621,7 @@
           <a:p>
             <a:fld id="{AA15C506-BC8A-46B5-9E53-D7E77151E582}" type="datetime1">
               <a:rPr lang="en-US" smtClean="0"/>
-              <a:t>11/10/2024</a:t>
+              <a:t>6/20/2025</a:t>
             </a:fld>
             <a:endParaRPr lang="en-US"/>
           </a:p>
@@ -4770,7 +4774,7 @@
           <a:p>
             <a:fld id="{23223682-8EDD-4542-AFCD-22B67282F25A}" type="datetime1">
               <a:rPr lang="en-US" smtClean="0"/>
-              <a:t>11/10/2024</a:t>
+              <a:t>6/20/2025</a:t>
             </a:fld>
             <a:endParaRPr lang="en-US"/>
           </a:p>
@@ -4942,7 +4946,7 @@
           <a:p>
             <a:fld id="{9A0BB87B-B7BC-450E-BB6A-701A176EB920}" type="datetime1">
               <a:rPr lang="en-US" smtClean="0"/>
-              <a:t>11/10/2024</a:t>
+              <a:t>6/20/2025</a:t>
             </a:fld>
             <a:endParaRPr lang="en-US"/>
           </a:p>
@@ -5129,7 +5133,7 @@
           <a:p>
             <a:fld id="{15EABFDF-330B-4262-AD2C-2A9706806DC1}" type="datetime1">
               <a:rPr lang="en-US" smtClean="0"/>
-              <a:t>11/10/2024</a:t>
+              <a:t>6/20/2025</a:t>
             </a:fld>
             <a:endParaRPr lang="en-US"/>
           </a:p>
@@ -5223,7 +5227,7 @@
           <a:p>
             <a:fld id="{5D072244-FF44-443E-A4C5-0263C8C92AE3}" type="datetime1">
               <a:rPr lang="en-US" smtClean="0"/>
-              <a:t>11/10/2024</a:t>
+              <a:t>6/20/2025</a:t>
             </a:fld>
             <a:endParaRPr lang="en-US"/>
           </a:p>
@@ -5363,7 +5367,7 @@
           <a:p>
             <a:fld id="{316AE70F-E9E3-4A03-BFAF-0612970F6B31}" type="datetime1">
               <a:rPr lang="en-US" smtClean="0"/>
-              <a:t>11/10/2024</a:t>
+              <a:t>6/20/2025</a:t>
             </a:fld>
             <a:endParaRPr lang="en-US"/>
           </a:p>
@@ -5508,7 +5512,7 @@
           <a:p>
             <a:fld id="{CDD985FA-700C-432C-ACDD-A3593AB11BF8}" type="datetime1">
               <a:rPr lang="en-US" smtClean="0"/>
-              <a:t>11/10/2024</a:t>
+              <a:t>6/20/2025</a:t>
             </a:fld>
             <a:endParaRPr lang="en-US"/>
           </a:p>
@@ -5648,7 +5652,7 @@
           <a:p>
             <a:fld id="{B9626394-AB31-4EB9-8754-BB40B0CDA0D1}" type="datetime1">
               <a:rPr lang="en-US" smtClean="0"/>
-              <a:t>11/10/2024</a:t>
+              <a:t>6/20/2025</a:t>
             </a:fld>
             <a:endParaRPr lang="en-US"/>
           </a:p>
@@ -5812,7 +5816,7 @@
           <a:p>
             <a:fld id="{4C080C8B-5F0B-457A-99AD-CAFD1879423D}" type="datetime1">
               <a:rPr lang="en-US" smtClean="0"/>
-              <a:t>11/10/2024</a:t>
+              <a:t>6/20/2025</a:t>
             </a:fld>
             <a:endParaRPr lang="en-US"/>
           </a:p>
@@ -5979,7 +5983,7 @@
           <a:p>
             <a:fld id="{3E6F4339-401A-474E-AB86-D925673D7133}" type="datetime1">
               <a:rPr lang="en-US" smtClean="0"/>
-              <a:t>11/10/2024</a:t>
+              <a:t>6/20/2025</a:t>
             </a:fld>
             <a:endParaRPr lang="en-US"/>
           </a:p>

</xml_diff>